<commit_message>
final PPT -- with Google Maps API
</commit_message>
<xml_diff>
--- a/documentation/WebProject09112021.pptx
+++ b/documentation/WebProject09112021.pptx
@@ -14,7 +14,7 @@
     <p:sldId id="266" r:id="rId8"/>
     <p:sldId id="263" r:id="rId9"/>
     <p:sldId id="264" r:id="rId10"/>
-    <p:sldId id="265" r:id="rId11"/>
+    <p:sldId id="267" r:id="rId11"/>
   </p:sldIdLst>
   <p:sldSz cx="12192000" cy="6858000"/>
   <p:notesSz cx="6858000" cy="9144000"/>
@@ -113,7 +113,93 @@
       </a:defRPr>
     </a:lvl9pPr>
   </p:defaultTextStyle>
+  <p:extLst>
+    <p:ext uri="{EFAFB233-063F-42B5-8137-9DF3F51BA10A}">
+      <p15:sldGuideLst xmlns:p15="http://schemas.microsoft.com/office/powerpoint/2012/main"/>
+    </p:ext>
+  </p:extLst>
 </p:presentation>
+</file>
+
+<file path=ppt/changesInfos/changesInfo1.xml><?xml version="1.0" encoding="utf-8"?>
+<pc:chgInfo xmlns:a="http://schemas.openxmlformats.org/drawingml/2006/main" xmlns:r="http://schemas.openxmlformats.org/officeDocument/2006/relationships" xmlns:ac="http://schemas.microsoft.com/office/drawing/2013/main/command" xmlns:pc="http://schemas.microsoft.com/office/powerpoint/2013/main/command">
+  <pc:docChgLst>
+    <pc:chgData name="Jasmin Baechle" userId="b8fdc04e-94c6-4110-ab30-f87698c12aff" providerId="ADAL" clId="{FCAEDEC1-B813-4798-8FA8-DD74A1ECC773}"/>
+    <pc:docChg chg="custSel addSld delSld modSld modMainMaster">
+      <pc:chgData name="Jasmin Baechle" userId="b8fdc04e-94c6-4110-ab30-f87698c12aff" providerId="ADAL" clId="{FCAEDEC1-B813-4798-8FA8-DD74A1ECC773}" dt="2021-11-09T11:25:27.169" v="192"/>
+      <pc:docMkLst>
+        <pc:docMk/>
+      </pc:docMkLst>
+      <pc:sldChg chg="modSp">
+        <pc:chgData name="Jasmin Baechle" userId="b8fdc04e-94c6-4110-ab30-f87698c12aff" providerId="ADAL" clId="{FCAEDEC1-B813-4798-8FA8-DD74A1ECC773}" dt="2021-11-09T11:24:03.755" v="159" actId="20577"/>
+        <pc:sldMkLst>
+          <pc:docMk/>
+          <pc:sldMk cId="1531576243" sldId="257"/>
+        </pc:sldMkLst>
+        <pc:graphicFrameChg chg="mod">
+          <ac:chgData name="Jasmin Baechle" userId="b8fdc04e-94c6-4110-ab30-f87698c12aff" providerId="ADAL" clId="{FCAEDEC1-B813-4798-8FA8-DD74A1ECC773}" dt="2021-11-09T11:24:03.755" v="159" actId="20577"/>
+          <ac:graphicFrameMkLst>
+            <pc:docMk/>
+            <pc:sldMk cId="1531576243" sldId="257"/>
+            <ac:graphicFrameMk id="10" creationId="{F9E30F89-1C98-A742-9257-E6ABFC5A0C9C}"/>
+          </ac:graphicFrameMkLst>
+        </pc:graphicFrameChg>
+      </pc:sldChg>
+      <pc:sldChg chg="modSp mod">
+        <pc:chgData name="Jasmin Baechle" userId="b8fdc04e-94c6-4110-ab30-f87698c12aff" providerId="ADAL" clId="{FCAEDEC1-B813-4798-8FA8-DD74A1ECC773}" dt="2021-11-09T11:25:05.332" v="161" actId="20577"/>
+        <pc:sldMkLst>
+          <pc:docMk/>
+          <pc:sldMk cId="102105303" sldId="262"/>
+        </pc:sldMkLst>
+        <pc:spChg chg="mod">
+          <ac:chgData name="Jasmin Baechle" userId="b8fdc04e-94c6-4110-ab30-f87698c12aff" providerId="ADAL" clId="{FCAEDEC1-B813-4798-8FA8-DD74A1ECC773}" dt="2021-11-09T11:25:05.332" v="161" actId="20577"/>
+          <ac:spMkLst>
+            <pc:docMk/>
+            <pc:sldMk cId="102105303" sldId="262"/>
+            <ac:spMk id="3" creationId="{A1E3C762-77CF-084E-96EB-E2362C430036}"/>
+          </ac:spMkLst>
+        </pc:spChg>
+      </pc:sldChg>
+      <pc:sldChg chg="del">
+        <pc:chgData name="Jasmin Baechle" userId="b8fdc04e-94c6-4110-ab30-f87698c12aff" providerId="ADAL" clId="{FCAEDEC1-B813-4798-8FA8-DD74A1ECC773}" dt="2021-11-09T11:23:52.586" v="158" actId="2696"/>
+        <pc:sldMkLst>
+          <pc:docMk/>
+          <pc:sldMk cId="861550287" sldId="265"/>
+        </pc:sldMkLst>
+      </pc:sldChg>
+      <pc:sldChg chg="modSp add mod">
+        <pc:chgData name="Jasmin Baechle" userId="b8fdc04e-94c6-4110-ab30-f87698c12aff" providerId="ADAL" clId="{FCAEDEC1-B813-4798-8FA8-DD74A1ECC773}" dt="2021-11-09T10:25:20.453" v="156" actId="20577"/>
+        <pc:sldMkLst>
+          <pc:docMk/>
+          <pc:sldMk cId="3314142611" sldId="267"/>
+        </pc:sldMkLst>
+        <pc:spChg chg="mod">
+          <ac:chgData name="Jasmin Baechle" userId="b8fdc04e-94c6-4110-ab30-f87698c12aff" providerId="ADAL" clId="{FCAEDEC1-B813-4798-8FA8-DD74A1ECC773}" dt="2021-11-09T10:25:20.453" v="156" actId="20577"/>
+          <ac:spMkLst>
+            <pc:docMk/>
+            <pc:sldMk cId="3314142611" sldId="267"/>
+            <ac:spMk id="3" creationId="{A1E3C762-77CF-084E-96EB-E2362C430036}"/>
+          </ac:spMkLst>
+        </pc:spChg>
+      </pc:sldChg>
+      <pc:sldMasterChg chg="addSp modSp mod">
+        <pc:chgData name="Jasmin Baechle" userId="b8fdc04e-94c6-4110-ab30-f87698c12aff" providerId="ADAL" clId="{FCAEDEC1-B813-4798-8FA8-DD74A1ECC773}" dt="2021-11-09T11:25:27.169" v="192"/>
+        <pc:sldMasterMkLst>
+          <pc:docMk/>
+          <pc:sldMasterMk cId="2294922169" sldId="2147483648"/>
+        </pc:sldMasterMkLst>
+        <pc:spChg chg="add mod ord modVis">
+          <ac:chgData name="Jasmin Baechle" userId="b8fdc04e-94c6-4110-ab30-f87698c12aff" providerId="ADAL" clId="{FCAEDEC1-B813-4798-8FA8-DD74A1ECC773}" dt="2021-11-09T11:25:27.169" v="192"/>
+          <ac:spMkLst>
+            <pc:docMk/>
+            <pc:sldMasterMk cId="2294922169" sldId="2147483648"/>
+            <ac:spMk id="7" creationId="{12BCDACA-5207-46A7-97B7-FEECE38C0F06}"/>
+          </ac:spMkLst>
+        </pc:spChg>
+      </pc:sldMasterChg>
+    </pc:docChg>
+  </pc:docChgLst>
+</pc:chgInfo>
 </file>
 
 <file path=ppt/diagrams/colors1.xml><?xml version="1.0" encoding="utf-8"?>
@@ -1795,7 +1881,7 @@
         <a:p>
           <a:r>
             <a:rPr lang="en-GB" dirty="0" err="1"/>
-            <a:t>Intiierung</a:t>
+            <a:t>Initiierung</a:t>
           </a:r>
           <a:endParaRPr lang="en-GB" dirty="0"/>
         </a:p>
@@ -2019,8 +2105,8 @@
     <dgm:cxn modelId="{62B7861F-09F4-FF41-86BE-A94FDCDE1609}" srcId="{5F055634-8CE7-5C43-BEBD-85206A3DF30A}" destId="{08DBF9A7-3F0E-4145-B375-DF6A949AD183}" srcOrd="0" destOrd="0" parTransId="{029E3A00-0FEB-3148-B68E-7C36A005C46D}" sibTransId="{4F7E1EAD-9351-C44F-B345-27D6B3043511}"/>
     <dgm:cxn modelId="{9044FE34-6EB2-4240-AFA6-2F70AE0B04A8}" type="presOf" srcId="{60F1103C-DE11-2A46-963D-CB4F15EF6D05}" destId="{5E485D4A-74C8-9441-BA0E-C0B90E02E64C}" srcOrd="0" destOrd="0" presId="urn:microsoft.com/office/officeart/2005/8/layout/chevron1"/>
     <dgm:cxn modelId="{326FE742-676B-B54C-9305-515020673180}" type="presOf" srcId="{5F055634-8CE7-5C43-BEBD-85206A3DF30A}" destId="{A6A599EB-2569-CE42-A743-4F1EDD42084B}" srcOrd="0" destOrd="0" presId="urn:microsoft.com/office/officeart/2005/8/layout/chevron1"/>
+    <dgm:cxn modelId="{E616A56D-B125-EB4B-ADD7-794CC847F2FD}" type="presOf" srcId="{08DBF9A7-3F0E-4145-B375-DF6A949AD183}" destId="{6405E485-6EBC-D648-BAD8-34E097CEC756}" srcOrd="0" destOrd="0" presId="urn:microsoft.com/office/officeart/2005/8/layout/chevron1"/>
     <dgm:cxn modelId="{C0F70553-AEBA-094C-B555-32E6B372BCE2}" srcId="{5F055634-8CE7-5C43-BEBD-85206A3DF30A}" destId="{77CD8D77-55AE-3C4A-AB5B-9DF0DEB161A3}" srcOrd="1" destOrd="0" parTransId="{41DACB92-FBE1-FC4E-BC6F-78BE5CE3DFA5}" sibTransId="{E405E093-6C17-404E-AC2B-2140D79CF009}"/>
-    <dgm:cxn modelId="{E616A56D-B125-EB4B-ADD7-794CC847F2FD}" type="presOf" srcId="{08DBF9A7-3F0E-4145-B375-DF6A949AD183}" destId="{6405E485-6EBC-D648-BAD8-34E097CEC756}" srcOrd="0" destOrd="0" presId="urn:microsoft.com/office/officeart/2005/8/layout/chevron1"/>
     <dgm:cxn modelId="{0DA42B88-6C46-D54F-8C5A-E26F1A500F33}" srcId="{5F055634-8CE7-5C43-BEBD-85206A3DF30A}" destId="{66458888-EA55-6A44-A807-B6270E6F7F45}" srcOrd="3" destOrd="0" parTransId="{E8EBA432-3ABA-C54B-AFD8-A05807AD5180}" sibTransId="{20AED11F-FF45-9F4F-BDE7-00E48BB8283F}"/>
     <dgm:cxn modelId="{4F56E0CE-82E5-B74B-A19B-FEDD6236936E}" srcId="{5F055634-8CE7-5C43-BEBD-85206A3DF30A}" destId="{B3450B58-9D3E-FA43-9FC5-E13CA80CCFB1}" srcOrd="2" destOrd="0" parTransId="{699F87B5-9B7F-924D-B42F-4FF1F5DED2D5}" sibTransId="{43A34A81-2EFF-0146-9B93-A346564F359F}"/>
     <dgm:cxn modelId="{CB382BD4-C703-784E-81FD-CFF71BADDE10}" type="presOf" srcId="{66458888-EA55-6A44-A807-B6270E6F7F45}" destId="{26CA4D62-E00A-8F45-9401-49E7AE5C47E9}" srcOrd="0" destOrd="0" presId="urn:microsoft.com/office/officeart/2005/8/layout/chevron1"/>
@@ -2589,7 +2675,7 @@
           </a:pPr>
           <a:r>
             <a:rPr lang="en-GB" sz="2100" kern="1200" dirty="0" err="1"/>
-            <a:t>Intiierung</a:t>
+            <a:t>Initiierung</a:t>
           </a:r>
           <a:endParaRPr lang="en-GB" sz="2100" kern="1200" dirty="0"/>
         </a:p>
@@ -6109,7 +6195,7 @@
           <a:p>
             <a:fld id="{0AAD08F8-6CE5-0043-939D-272FD68FA88E}" type="datetimeFigureOut">
               <a:rPr lang="en-CH" smtClean="0"/>
-              <a:t>08.11.21</a:t>
+              <a:t>11/09/2021</a:t>
             </a:fld>
             <a:endParaRPr lang="en-CH"/>
           </a:p>
@@ -6163,7 +6249,7 @@
           <a:p>
             <a:fld id="{6F59D622-2414-F940-B2AF-19D6B33F44C1}" type="slidenum">
               <a:rPr lang="en-CH" smtClean="0"/>
-              <a:t>‹#›</a:t>
+              <a:t>‹Nr.›</a:t>
             </a:fld>
             <a:endParaRPr lang="en-CH"/>
           </a:p>
@@ -6309,7 +6395,7 @@
           <a:p>
             <a:fld id="{0AAD08F8-6CE5-0043-939D-272FD68FA88E}" type="datetimeFigureOut">
               <a:rPr lang="en-CH" smtClean="0"/>
-              <a:t>08.11.21</a:t>
+              <a:t>11/09/2021</a:t>
             </a:fld>
             <a:endParaRPr lang="en-CH"/>
           </a:p>
@@ -6363,7 +6449,7 @@
           <a:p>
             <a:fld id="{6F59D622-2414-F940-B2AF-19D6B33F44C1}" type="slidenum">
               <a:rPr lang="en-CH" smtClean="0"/>
-              <a:t>‹#›</a:t>
+              <a:t>‹Nr.›</a:t>
             </a:fld>
             <a:endParaRPr lang="en-CH"/>
           </a:p>
@@ -6519,7 +6605,7 @@
           <a:p>
             <a:fld id="{0AAD08F8-6CE5-0043-939D-272FD68FA88E}" type="datetimeFigureOut">
               <a:rPr lang="en-CH" smtClean="0"/>
-              <a:t>08.11.21</a:t>
+              <a:t>11/09/2021</a:t>
             </a:fld>
             <a:endParaRPr lang="en-CH"/>
           </a:p>
@@ -6573,7 +6659,7 @@
           <a:p>
             <a:fld id="{6F59D622-2414-F940-B2AF-19D6B33F44C1}" type="slidenum">
               <a:rPr lang="en-CH" smtClean="0"/>
-              <a:t>‹#›</a:t>
+              <a:t>‹Nr.›</a:t>
             </a:fld>
             <a:endParaRPr lang="en-CH"/>
           </a:p>
@@ -6719,7 +6805,7 @@
           <a:p>
             <a:fld id="{0AAD08F8-6CE5-0043-939D-272FD68FA88E}" type="datetimeFigureOut">
               <a:rPr lang="en-CH" smtClean="0"/>
-              <a:t>08.11.21</a:t>
+              <a:t>11/09/2021</a:t>
             </a:fld>
             <a:endParaRPr lang="en-CH"/>
           </a:p>
@@ -6773,7 +6859,7 @@
           <a:p>
             <a:fld id="{6F59D622-2414-F940-B2AF-19D6B33F44C1}" type="slidenum">
               <a:rPr lang="en-CH" smtClean="0"/>
-              <a:t>‹#›</a:t>
+              <a:t>‹Nr.›</a:t>
             </a:fld>
             <a:endParaRPr lang="en-CH"/>
           </a:p>
@@ -6995,7 +7081,7 @@
           <a:p>
             <a:fld id="{0AAD08F8-6CE5-0043-939D-272FD68FA88E}" type="datetimeFigureOut">
               <a:rPr lang="en-CH" smtClean="0"/>
-              <a:t>08.11.21</a:t>
+              <a:t>11/09/2021</a:t>
             </a:fld>
             <a:endParaRPr lang="en-CH"/>
           </a:p>
@@ -7049,7 +7135,7 @@
           <a:p>
             <a:fld id="{6F59D622-2414-F940-B2AF-19D6B33F44C1}" type="slidenum">
               <a:rPr lang="en-CH" smtClean="0"/>
-              <a:t>‹#›</a:t>
+              <a:t>‹Nr.›</a:t>
             </a:fld>
             <a:endParaRPr lang="en-CH"/>
           </a:p>
@@ -7263,7 +7349,7 @@
           <a:p>
             <a:fld id="{0AAD08F8-6CE5-0043-939D-272FD68FA88E}" type="datetimeFigureOut">
               <a:rPr lang="en-CH" smtClean="0"/>
-              <a:t>08.11.21</a:t>
+              <a:t>11/09/2021</a:t>
             </a:fld>
             <a:endParaRPr lang="en-CH"/>
           </a:p>
@@ -7317,7 +7403,7 @@
           <a:p>
             <a:fld id="{6F59D622-2414-F940-B2AF-19D6B33F44C1}" type="slidenum">
               <a:rPr lang="en-CH" smtClean="0"/>
-              <a:t>‹#›</a:t>
+              <a:t>‹Nr.›</a:t>
             </a:fld>
             <a:endParaRPr lang="en-CH"/>
           </a:p>
@@ -7678,7 +7764,7 @@
           <a:p>
             <a:fld id="{0AAD08F8-6CE5-0043-939D-272FD68FA88E}" type="datetimeFigureOut">
               <a:rPr lang="en-CH" smtClean="0"/>
-              <a:t>08.11.21</a:t>
+              <a:t>11/09/2021</a:t>
             </a:fld>
             <a:endParaRPr lang="en-CH"/>
           </a:p>
@@ -7732,7 +7818,7 @@
           <a:p>
             <a:fld id="{6F59D622-2414-F940-B2AF-19D6B33F44C1}" type="slidenum">
               <a:rPr lang="en-CH" smtClean="0"/>
-              <a:t>‹#›</a:t>
+              <a:t>‹Nr.›</a:t>
             </a:fld>
             <a:endParaRPr lang="en-CH"/>
           </a:p>
@@ -7820,7 +7906,7 @@
           <a:p>
             <a:fld id="{0AAD08F8-6CE5-0043-939D-272FD68FA88E}" type="datetimeFigureOut">
               <a:rPr lang="en-CH" smtClean="0"/>
-              <a:t>08.11.21</a:t>
+              <a:t>11/09/2021</a:t>
             </a:fld>
             <a:endParaRPr lang="en-CH"/>
           </a:p>
@@ -7874,7 +7960,7 @@
           <a:p>
             <a:fld id="{6F59D622-2414-F940-B2AF-19D6B33F44C1}" type="slidenum">
               <a:rPr lang="en-CH" smtClean="0"/>
-              <a:t>‹#›</a:t>
+              <a:t>‹Nr.›</a:t>
             </a:fld>
             <a:endParaRPr lang="en-CH"/>
           </a:p>
@@ -7933,7 +8019,7 @@
           <a:p>
             <a:fld id="{0AAD08F8-6CE5-0043-939D-272FD68FA88E}" type="datetimeFigureOut">
               <a:rPr lang="en-CH" smtClean="0"/>
-              <a:t>08.11.21</a:t>
+              <a:t>11/09/2021</a:t>
             </a:fld>
             <a:endParaRPr lang="en-CH"/>
           </a:p>
@@ -7987,7 +8073,7 @@
           <a:p>
             <a:fld id="{6F59D622-2414-F940-B2AF-19D6B33F44C1}" type="slidenum">
               <a:rPr lang="en-CH" smtClean="0"/>
-              <a:t>‹#›</a:t>
+              <a:t>‹Nr.›</a:t>
             </a:fld>
             <a:endParaRPr lang="en-CH"/>
           </a:p>
@@ -8246,7 +8332,7 @@
           <a:p>
             <a:fld id="{0AAD08F8-6CE5-0043-939D-272FD68FA88E}" type="datetimeFigureOut">
               <a:rPr lang="en-CH" smtClean="0"/>
-              <a:t>08.11.21</a:t>
+              <a:t>11/09/2021</a:t>
             </a:fld>
             <a:endParaRPr lang="en-CH"/>
           </a:p>
@@ -8300,7 +8386,7 @@
           <a:p>
             <a:fld id="{6F59D622-2414-F940-B2AF-19D6B33F44C1}" type="slidenum">
               <a:rPr lang="en-CH" smtClean="0"/>
-              <a:t>‹#›</a:t>
+              <a:t>‹Nr.›</a:t>
             </a:fld>
             <a:endParaRPr lang="en-CH"/>
           </a:p>
@@ -8535,7 +8621,7 @@
           <a:p>
             <a:fld id="{0AAD08F8-6CE5-0043-939D-272FD68FA88E}" type="datetimeFigureOut">
               <a:rPr lang="en-CH" smtClean="0"/>
-              <a:t>08.11.21</a:t>
+              <a:t>11/09/2021</a:t>
             </a:fld>
             <a:endParaRPr lang="en-CH"/>
           </a:p>
@@ -8589,7 +8675,7 @@
           <a:p>
             <a:fld id="{6F59D622-2414-F940-B2AF-19D6B33F44C1}" type="slidenum">
               <a:rPr lang="en-CH" smtClean="0"/>
-              <a:t>‹#›</a:t>
+              <a:t>‹Nr.›</a:t>
             </a:fld>
             <a:endParaRPr lang="en-CH"/>
           </a:p>
@@ -8778,7 +8864,7 @@
           <a:p>
             <a:fld id="{0AAD08F8-6CE5-0043-939D-272FD68FA88E}" type="datetimeFigureOut">
               <a:rPr lang="en-CH" smtClean="0"/>
-              <a:t>08.11.21</a:t>
+              <a:t>11/09/2021</a:t>
             </a:fld>
             <a:endParaRPr lang="en-CH"/>
           </a:p>
@@ -8868,9 +8954,57 @@
           <a:p>
             <a:fld id="{6F59D622-2414-F940-B2AF-19D6B33F44C1}" type="slidenum">
               <a:rPr lang="en-CH" smtClean="0"/>
-              <a:t>‹#›</a:t>
+              <a:t>‹Nr.›</a:t>
             </a:fld>
             <a:endParaRPr lang="en-CH"/>
+          </a:p>
+        </p:txBody>
+      </p:sp>
+      <p:sp>
+        <p:nvSpPr>
+          <p:cNvPr id="7" name="MSIPCMContentMarking" descr="{&quot;HashCode&quot;:-242339457,&quot;Placement&quot;:&quot;Footer&quot;}">
+            <a:extLst>
+              <a:ext uri="{FF2B5EF4-FFF2-40B4-BE49-F238E27FC236}">
+                <a16:creationId xmlns:a16="http://schemas.microsoft.com/office/drawing/2014/main" id="{12BCDACA-5207-46A7-97B7-FEECE38C0F06}"/>
+              </a:ext>
+            </a:extLst>
+          </p:cNvPr>
+          <p:cNvSpPr txBox="1"/>
+          <p:nvPr userDrawn="1"/>
+        </p:nvSpPr>
+        <p:spPr>
+          <a:xfrm>
+            <a:off x="10318885" y="6390570"/>
+            <a:ext cx="1873115" cy="467429"/>
+          </a:xfrm>
+          <a:prstGeom prst="rect">
+            <a:avLst/>
+          </a:prstGeom>
+          <a:noFill/>
+        </p:spPr>
+        <p:txBody>
+          <a:bodyPr vert="horz" wrap="square" lIns="0" tIns="0" rIns="0" bIns="0" rtlCol="0" anchor="ctr" anchorCtr="1">
+            <a:spAutoFit/>
+          </a:bodyPr>
+          <a:lstStyle/>
+          <a:p>
+            <a:pPr algn="r">
+              <a:spcBef>
+                <a:spcPts val="0"/>
+              </a:spcBef>
+              <a:spcAft>
+                <a:spcPts val="0"/>
+              </a:spcAft>
+            </a:pPr>
+            <a:r>
+              <a:rPr lang="de-DE" sz="2200">
+                <a:solidFill>
+                  <a:srgbClr val="FF8939"/>
+                </a:solidFill>
+                <a:latin typeface="Calibri" panose="020F0502020204030204" pitchFamily="34" charset="0"/>
+              </a:rPr>
+              <a:t>RESTRICTED</a:t>
+            </a:r>
           </a:p>
         </p:txBody>
       </p:sp>
@@ -10837,17 +10971,6 @@
               <a:buChar char="v"/>
             </a:pPr>
             <a:r>
-              <a:rPr lang="en-US" sz="2400" b="1" dirty="0" err="1">
-                <a:solidFill>
-                  <a:schemeClr val="accent2">
-                    <a:lumMod val="60000"/>
-                    <a:lumOff val="40000"/>
-                  </a:schemeClr>
-                </a:solidFill>
-              </a:rPr>
-              <a:t>Positionstack</a:t>
-            </a:r>
-            <a:r>
               <a:rPr lang="en-US" sz="2400" b="1" dirty="0">
                 <a:solidFill>
                   <a:schemeClr val="accent2">
@@ -10856,7 +10979,7 @@
                   </a:schemeClr>
                 </a:solidFill>
               </a:rPr>
-              <a:t> API</a:t>
+              <a:t>Google Maps API</a:t>
             </a:r>
           </a:p>
           <a:p>
@@ -10891,8 +11014,28 @@
               <a:buChar char="•"/>
             </a:pPr>
             <a:r>
+              <a:rPr lang="en-US" sz="2400" dirty="0"/>
+              <a:t>Distance Matrix API </a:t>
+            </a:r>
+            <a:r>
               <a:rPr lang="en-US" sz="2400" dirty="0" err="1"/>
-              <a:t>Vorwärts</a:t>
+              <a:t>wird</a:t>
+            </a:r>
+            <a:r>
+              <a:rPr lang="en-US" sz="2400" dirty="0"/>
+              <a:t> </a:t>
+            </a:r>
+            <a:r>
+              <a:rPr lang="en-US" sz="2400" dirty="0" err="1"/>
+              <a:t>benutzt</a:t>
+            </a:r>
+            <a:r>
+              <a:rPr lang="en-US" sz="2400" dirty="0"/>
+              <a:t>, um </a:t>
+            </a:r>
+            <a:r>
+              <a:rPr lang="en-US" sz="2400" dirty="0" err="1"/>
+              <a:t>Fahrzeiten</a:t>
             </a:r>
             <a:r>
               <a:rPr lang="en-US" sz="2400" dirty="0"/>
@@ -10900,7 +11043,7 @@
             </a:r>
             <a:r>
               <a:rPr lang="en-US" sz="2400" dirty="0" err="1"/>
-              <a:t>rückwärts</a:t>
+              <a:t>Entfernungen</a:t>
             </a:r>
             <a:r>
               <a:rPr lang="en-US" sz="2400" dirty="0"/>
@@ -10908,15 +11051,7 @@
             </a:r>
             <a:r>
               <a:rPr lang="en-US" sz="2400" dirty="0" err="1"/>
-              <a:t>geocordierung</a:t>
-            </a:r>
-            <a:r>
-              <a:rPr lang="en-US" sz="2400" dirty="0"/>
-              <a:t> von </a:t>
-            </a:r>
-            <a:r>
-              <a:rPr lang="en-US" sz="2400" dirty="0" err="1"/>
-              <a:t>mehr</a:t>
+              <a:t>für</a:t>
             </a:r>
             <a:r>
               <a:rPr lang="en-US" sz="2400" dirty="0"/>
@@ -10924,15 +11059,15 @@
             </a:r>
             <a:r>
               <a:rPr lang="en-US" sz="2400" dirty="0" err="1"/>
-              <a:t>als</a:t>
+              <a:t>mehrere</a:t>
             </a:r>
             <a:r>
               <a:rPr lang="en-US" sz="2400" dirty="0"/>
-              <a:t> 2 </a:t>
+              <a:t> Start- und </a:t>
             </a:r>
             <a:r>
               <a:rPr lang="en-US" sz="2400" dirty="0" err="1"/>
-              <a:t>Milliarden</a:t>
+              <a:t>Zielorte</a:t>
             </a:r>
             <a:r>
               <a:rPr lang="en-US" sz="2400" dirty="0"/>
@@ -10940,7 +11075,7 @@
             </a:r>
             <a:r>
               <a:rPr lang="en-US" sz="2400" dirty="0" err="1"/>
-              <a:t>Adressen</a:t>
+              <a:t>zu</a:t>
             </a:r>
             <a:r>
               <a:rPr lang="en-US" sz="2400" dirty="0"/>
@@ -10948,7 +11083,7 @@
             </a:r>
             <a:r>
               <a:rPr lang="en-US" sz="2400" dirty="0" err="1"/>
-              <a:t>weltweit</a:t>
+              <a:t>berechnen</a:t>
             </a:r>
             <a:endParaRPr lang="en-US" sz="2400" dirty="0"/>
           </a:p>
@@ -11136,11 +11271,11 @@
             </a:r>
             <a:r>
               <a:rPr lang="en-US" sz="2400" dirty="0" err="1"/>
-              <a:t>Entferung</a:t>
+              <a:t>Fahrzeit</a:t>
             </a:r>
             <a:r>
               <a:rPr lang="en-US" sz="2400" dirty="0"/>
-              <a:t> der </a:t>
+              <a:t> von </a:t>
             </a:r>
             <a:r>
               <a:rPr lang="en-US" sz="2400" dirty="0" err="1"/>
@@ -11148,7 +11283,15 @@
             </a:r>
             <a:r>
               <a:rPr lang="en-US" sz="2400" dirty="0"/>
-              <a:t> von Restaurant * 50 km/h + 1 h = </a:t>
+              <a:t> bis Restaurant + 1 h </a:t>
+            </a:r>
+            <a:r>
+              <a:rPr lang="en-US" sz="2400" dirty="0" err="1"/>
+              <a:t>Zubereitungszeit</a:t>
+            </a:r>
+            <a:r>
+              <a:rPr lang="en-US" sz="2400" dirty="0"/>
+              <a:t> = </a:t>
             </a:r>
             <a:r>
               <a:rPr lang="en-US" sz="2400" dirty="0" err="1"/>
@@ -11286,7 +11429,7 @@
     </p:spTree>
     <p:extLst>
       <p:ext uri="{BB962C8B-B14F-4D97-AF65-F5344CB8AC3E}">
-        <p14:creationId xmlns:p14="http://schemas.microsoft.com/office/powerpoint/2010/main" val="861550287"/>
+        <p14:creationId xmlns:p14="http://schemas.microsoft.com/office/powerpoint/2010/main" val="3314142611"/>
       </p:ext>
     </p:extLst>
   </p:cSld>
@@ -11630,7 +11773,7 @@
           <p:nvPr>
             <p:extLst>
               <p:ext uri="{D42A27DB-BD31-4B8C-83A1-F6EECF244321}">
-                <p14:modId xmlns:p14="http://schemas.microsoft.com/office/powerpoint/2010/main" val="1548300488"/>
+                <p14:modId xmlns:p14="http://schemas.microsoft.com/office/powerpoint/2010/main" val="1686741517"/>
               </p:ext>
             </p:extLst>
           </p:nvPr>
@@ -12928,12 +13071,20 @@
               <a:buChar char="•"/>
             </a:pPr>
             <a:r>
+              <a:rPr lang="en-US" sz="2400" dirty="0" err="1">
+                <a:solidFill>
+                  <a:srgbClr val="FFFFFF"/>
+                </a:solidFill>
+              </a:rPr>
+              <a:t>Paket</a:t>
+            </a:r>
+            <a:r>
               <a:rPr lang="en-US" sz="2400" dirty="0">
                 <a:solidFill>
                   <a:srgbClr val="FFFFFF"/>
                 </a:solidFill>
               </a:rPr>
-              <a:t>Paket1: Aufbau der </a:t>
+              <a:t> 1: Aufbau der </a:t>
             </a:r>
             <a:r>
               <a:rPr lang="en-US" sz="2400" dirty="0" err="1">
@@ -12941,7 +13092,7 @@
                   <a:srgbClr val="FFFFFF"/>
                 </a:solidFill>
               </a:rPr>
-              <a:t>Stuktur</a:t>
+              <a:t>Struktur</a:t>
             </a:r>
             <a:r>
               <a:rPr lang="en-US" sz="2400" dirty="0">
@@ -12980,12 +13131,20 @@
               <a:buChar char="•"/>
             </a:pPr>
             <a:r>
+              <a:rPr lang="en-US" sz="2400" dirty="0" err="1">
+                <a:solidFill>
+                  <a:srgbClr val="FFFFFF"/>
+                </a:solidFill>
+              </a:rPr>
+              <a:t>Paket</a:t>
+            </a:r>
+            <a:r>
               <a:rPr lang="en-US" sz="2400" dirty="0">
                 <a:solidFill>
                   <a:srgbClr val="FFFFFF"/>
                 </a:solidFill>
               </a:rPr>
-              <a:t>Paket2: </a:t>
+              <a:t> 2: </a:t>
             </a:r>
             <a:r>
               <a:rPr lang="en-US" sz="2400" dirty="0" err="1">

</xml_diff>

<commit_message>
added a to do list
</commit_message>
<xml_diff>
--- a/documentation/WebProject09112021.pptx
+++ b/documentation/WebProject09112021.pptx
@@ -126,7 +126,7 @@
   <pc:docChgLst>
     <pc:chgData name="Jasmin Baechle" userId="b8fdc04e-94c6-4110-ab30-f87698c12aff" providerId="ADAL" clId="{FCAEDEC1-B813-4798-8FA8-DD74A1ECC773}"/>
     <pc:docChg chg="custSel addSld delSld modSld modMainMaster">
-      <pc:chgData name="Jasmin Baechle" userId="b8fdc04e-94c6-4110-ab30-f87698c12aff" providerId="ADAL" clId="{FCAEDEC1-B813-4798-8FA8-DD74A1ECC773}" dt="2021-11-09T11:25:27.169" v="192"/>
+      <pc:chgData name="Jasmin Baechle" userId="b8fdc04e-94c6-4110-ab30-f87698c12aff" providerId="ADAL" clId="{FCAEDEC1-B813-4798-8FA8-DD74A1ECC773}" dt="2021-11-09T13:29:55.218" v="194"/>
       <pc:docMkLst>
         <pc:docMk/>
       </pc:docMkLst>
@@ -182,14 +182,14 @@
           </ac:spMkLst>
         </pc:spChg>
       </pc:sldChg>
-      <pc:sldMasterChg chg="addSp modSp mod">
-        <pc:chgData name="Jasmin Baechle" userId="b8fdc04e-94c6-4110-ab30-f87698c12aff" providerId="ADAL" clId="{FCAEDEC1-B813-4798-8FA8-DD74A1ECC773}" dt="2021-11-09T11:25:27.169" v="192"/>
+      <pc:sldMasterChg chg="addSp delSp modSp mod">
+        <pc:chgData name="Jasmin Baechle" userId="b8fdc04e-94c6-4110-ab30-f87698c12aff" providerId="ADAL" clId="{FCAEDEC1-B813-4798-8FA8-DD74A1ECC773}" dt="2021-11-09T13:29:55.218" v="194"/>
         <pc:sldMasterMkLst>
           <pc:docMk/>
           <pc:sldMasterMk cId="2294922169" sldId="2147483648"/>
         </pc:sldMasterMkLst>
-        <pc:spChg chg="add mod ord modVis">
-          <ac:chgData name="Jasmin Baechle" userId="b8fdc04e-94c6-4110-ab30-f87698c12aff" providerId="ADAL" clId="{FCAEDEC1-B813-4798-8FA8-DD74A1ECC773}" dt="2021-11-09T11:25:27.169" v="192"/>
+        <pc:spChg chg="add del mod ord modVis">
+          <ac:chgData name="Jasmin Baechle" userId="b8fdc04e-94c6-4110-ab30-f87698c12aff" providerId="ADAL" clId="{FCAEDEC1-B813-4798-8FA8-DD74A1ECC773}" dt="2021-11-09T13:29:55.218" v="194"/>
           <ac:spMkLst>
             <pc:docMk/>
             <pc:sldMasterMk cId="2294922169" sldId="2147483648"/>
@@ -8960,54 +8960,6 @@
           </a:p>
         </p:txBody>
       </p:sp>
-      <p:sp>
-        <p:nvSpPr>
-          <p:cNvPr id="7" name="MSIPCMContentMarking" descr="{&quot;HashCode&quot;:-242339457,&quot;Placement&quot;:&quot;Footer&quot;}">
-            <a:extLst>
-              <a:ext uri="{FF2B5EF4-FFF2-40B4-BE49-F238E27FC236}">
-                <a16:creationId xmlns:a16="http://schemas.microsoft.com/office/drawing/2014/main" id="{12BCDACA-5207-46A7-97B7-FEECE38C0F06}"/>
-              </a:ext>
-            </a:extLst>
-          </p:cNvPr>
-          <p:cNvSpPr txBox="1"/>
-          <p:nvPr userDrawn="1"/>
-        </p:nvSpPr>
-        <p:spPr>
-          <a:xfrm>
-            <a:off x="10318885" y="6390570"/>
-            <a:ext cx="1873115" cy="467429"/>
-          </a:xfrm>
-          <a:prstGeom prst="rect">
-            <a:avLst/>
-          </a:prstGeom>
-          <a:noFill/>
-        </p:spPr>
-        <p:txBody>
-          <a:bodyPr vert="horz" wrap="square" lIns="0" tIns="0" rIns="0" bIns="0" rtlCol="0" anchor="ctr" anchorCtr="1">
-            <a:spAutoFit/>
-          </a:bodyPr>
-          <a:lstStyle/>
-          <a:p>
-            <a:pPr algn="r">
-              <a:spcBef>
-                <a:spcPts val="0"/>
-              </a:spcBef>
-              <a:spcAft>
-                <a:spcPts val="0"/>
-              </a:spcAft>
-            </a:pPr>
-            <a:r>
-              <a:rPr lang="de-DE" sz="2200">
-                <a:solidFill>
-                  <a:srgbClr val="FF8939"/>
-                </a:solidFill>
-                <a:latin typeface="Calibri" panose="020F0502020204030204" pitchFamily="34" charset="0"/>
-              </a:rPr>
-              <a:t>RESTRICTED</a:t>
-            </a:r>
-          </a:p>
-        </p:txBody>
-      </p:sp>
     </p:spTree>
     <p:extLst>
       <p:ext uri="{BB962C8B-B14F-4D97-AF65-F5344CB8AC3E}">

</xml_diff>